<commit_message>
Avancement du projet 5
</commit_message>
<xml_diff>
--- a/projet4/projet4.pptx
+++ b/projet4/projet4.pptx
@@ -136,7 +136,7 @@
   <pc:docChgLst>
     <pc:chgData name="Christophe Lebrun" userId="303fc86cbab77272" providerId="LiveId" clId="{97259FEB-7F4F-4512-9CCD-9417EB025341}"/>
     <pc:docChg chg="modSld">
-      <pc:chgData name="Christophe Lebrun" userId="303fc86cbab77272" providerId="LiveId" clId="{97259FEB-7F4F-4512-9CCD-9417EB025341}" dt="2019-09-05T17:03:17.151" v="15" actId="14100"/>
+      <pc:chgData name="Christophe Lebrun" userId="303fc86cbab77272" providerId="LiveId" clId="{97259FEB-7F4F-4512-9CCD-9417EB025341}" dt="2019-09-12T14:25:59.314" v="17" actId="1035"/>
       <pc:docMkLst>
         <pc:docMk/>
       </pc:docMkLst>
@@ -154,6 +154,21 @@
             <ac:spMk id="6" creationId="{968DD6B4-A058-473F-99B6-FECCF66B654A}"/>
           </ac:spMkLst>
         </pc:spChg>
+      </pc:sldChg>
+      <pc:sldChg chg="modSp">
+        <pc:chgData name="Christophe Lebrun" userId="303fc86cbab77272" providerId="LiveId" clId="{97259FEB-7F4F-4512-9CCD-9417EB025341}" dt="2019-09-12T14:25:59.314" v="17" actId="1035"/>
+        <pc:sldMkLst>
+          <pc:docMk/>
+          <pc:sldMk cId="3559895393" sldId="278"/>
+        </pc:sldMkLst>
+        <pc:picChg chg="mod">
+          <ac:chgData name="Christophe Lebrun" userId="303fc86cbab77272" providerId="LiveId" clId="{97259FEB-7F4F-4512-9CCD-9417EB025341}" dt="2019-09-12T14:25:59.314" v="17" actId="1035"/>
+          <ac:picMkLst>
+            <pc:docMk/>
+            <pc:sldMk cId="3559895393" sldId="278"/>
+            <ac:picMk id="7" creationId="{66AA73F2-622F-4C68-9B49-D36B2110457B}"/>
+          </ac:picMkLst>
+        </pc:picChg>
       </pc:sldChg>
     </pc:docChg>
   </pc:docChgLst>
@@ -1649,7 +1664,7 @@
           <a:p>
             <a:fld id="{A6994B78-A156-4E76-BB28-39D7E36AE272}" type="datetimeFigureOut">
               <a:rPr lang="fr-FR" smtClean="0"/>
-              <a:t>10/09/2019</a:t>
+              <a:t>12/09/2019</a:t>
             </a:fld>
             <a:endParaRPr lang="fr-FR"/>
           </a:p>
@@ -1807,7 +1822,7 @@
           <a:p>
             <a:fld id="{5AA8A231-FDF8-4574-A969-AC3B90D90B32}" type="slidenum">
               <a:rPr lang="fr-FR" smtClean="0"/>
-              <a:t>‹N°›</a:t>
+              <a:t>‹#›</a:t>
             </a:fld>
             <a:endParaRPr lang="fr-FR"/>
           </a:p>
@@ -2170,7 +2185,7 @@
           <a:p>
             <a:fld id="{21493104-0DD6-4188-A408-37748D818DBE}" type="datetime1">
               <a:rPr lang="fr-FR" smtClean="0"/>
-              <a:t>10/09/2019</a:t>
+              <a:t>12/09/2019</a:t>
             </a:fld>
             <a:endParaRPr lang="fr-FR"/>
           </a:p>
@@ -2222,7 +2237,7 @@
           <a:p>
             <a:fld id="{22EBEF4F-4056-4A7E-9612-F3E8B502E28B}" type="slidenum">
               <a:rPr lang="fr-FR" smtClean="0"/>
-              <a:t>‹N°›</a:t>
+              <a:t>‹#›</a:t>
             </a:fld>
             <a:endParaRPr lang="fr-FR"/>
           </a:p>
@@ -2437,7 +2452,7 @@
           <a:p>
             <a:fld id="{33EC2012-1BFF-4C92-91DA-ED5E44E2DAE6}" type="datetime1">
               <a:rPr lang="fr-FR" smtClean="0"/>
-              <a:t>10/09/2019</a:t>
+              <a:t>12/09/2019</a:t>
             </a:fld>
             <a:endParaRPr lang="fr-FR"/>
           </a:p>
@@ -2479,7 +2494,7 @@
           <a:p>
             <a:fld id="{22EBEF4F-4056-4A7E-9612-F3E8B502E28B}" type="slidenum">
               <a:rPr lang="fr-FR" smtClean="0"/>
-              <a:t>‹N°›</a:t>
+              <a:t>‹#›</a:t>
             </a:fld>
             <a:endParaRPr lang="fr-FR"/>
           </a:p>
@@ -2668,7 +2683,7 @@
           <a:p>
             <a:fld id="{36D54C82-D4A8-4BCC-BBE6-5333B0B84731}" type="datetime1">
               <a:rPr lang="fr-FR" smtClean="0"/>
-              <a:t>10/09/2019</a:t>
+              <a:t>12/09/2019</a:t>
             </a:fld>
             <a:endParaRPr lang="fr-FR"/>
           </a:p>
@@ -2720,7 +2735,7 @@
           <a:p>
             <a:fld id="{22EBEF4F-4056-4A7E-9612-F3E8B502E28B}" type="slidenum">
               <a:rPr lang="fr-FR" smtClean="0"/>
-              <a:t>‹N°›</a:t>
+              <a:t>‹#›</a:t>
             </a:fld>
             <a:endParaRPr lang="fr-FR"/>
           </a:p>
@@ -2978,7 +2993,7 @@
           <a:p>
             <a:fld id="{DDD00B7C-7A69-493A-8A97-AE08389BB3D5}" type="datetime1">
               <a:rPr lang="fr-FR" smtClean="0"/>
-              <a:t>10/09/2019</a:t>
+              <a:t>12/09/2019</a:t>
             </a:fld>
             <a:endParaRPr lang="fr-FR"/>
           </a:p>
@@ -3030,7 +3045,7 @@
           <a:p>
             <a:fld id="{22EBEF4F-4056-4A7E-9612-F3E8B502E28B}" type="slidenum">
               <a:rPr lang="fr-FR" smtClean="0"/>
-              <a:t>‹N°›</a:t>
+              <a:t>‹#›</a:t>
             </a:fld>
             <a:endParaRPr lang="fr-FR"/>
           </a:p>
@@ -3451,7 +3466,7 @@
           <a:p>
             <a:fld id="{551B583F-2DDE-447D-8CBF-9525FA0FB806}" type="datetime1">
               <a:rPr lang="fr-FR" smtClean="0"/>
-              <a:t>10/09/2019</a:t>
+              <a:t>12/09/2019</a:t>
             </a:fld>
             <a:endParaRPr lang="fr-FR"/>
           </a:p>
@@ -3503,7 +3518,7 @@
           <a:p>
             <a:fld id="{22EBEF4F-4056-4A7E-9612-F3E8B502E28B}" type="slidenum">
               <a:rPr lang="fr-FR" smtClean="0"/>
-              <a:t>‹N°›</a:t>
+              <a:t>‹#›</a:t>
             </a:fld>
             <a:endParaRPr lang="fr-FR"/>
           </a:p>
@@ -3998,7 +4013,7 @@
           <a:p>
             <a:fld id="{F196D0C2-EC15-4914-BD1C-8DC6D93A7E06}" type="datetime1">
               <a:rPr lang="fr-FR" smtClean="0"/>
-              <a:t>10/09/2019</a:t>
+              <a:t>12/09/2019</a:t>
             </a:fld>
             <a:endParaRPr lang="fr-FR"/>
           </a:p>
@@ -4040,7 +4055,7 @@
           <a:p>
             <a:fld id="{22EBEF4F-4056-4A7E-9612-F3E8B502E28B}" type="slidenum">
               <a:rPr lang="fr-FR" smtClean="0"/>
-              <a:t>‹N°›</a:t>
+              <a:t>‹#›</a:t>
             </a:fld>
             <a:endParaRPr lang="fr-FR"/>
           </a:p>
@@ -4772,7 +4787,7 @@
           <a:p>
             <a:fld id="{B0F0F71C-CB2D-46DF-BBF5-45A6CF07943D}" type="datetime1">
               <a:rPr lang="fr-FR" smtClean="0"/>
-              <a:t>10/09/2019</a:t>
+              <a:t>12/09/2019</a:t>
             </a:fld>
             <a:endParaRPr lang="fr-FR"/>
           </a:p>
@@ -4814,7 +4829,7 @@
           <a:p>
             <a:fld id="{22EBEF4F-4056-4A7E-9612-F3E8B502E28B}" type="slidenum">
               <a:rPr lang="fr-FR" smtClean="0"/>
-              <a:t>‹N°›</a:t>
+              <a:t>‹#›</a:t>
             </a:fld>
             <a:endParaRPr lang="fr-FR"/>
           </a:p>
@@ -4947,7 +4962,7 @@
           <a:p>
             <a:fld id="{D8EE97A0-E3EB-454D-B57B-09208F6C2349}" type="datetime1">
               <a:rPr lang="fr-FR" smtClean="0"/>
-              <a:t>10/09/2019</a:t>
+              <a:t>12/09/2019</a:t>
             </a:fld>
             <a:endParaRPr lang="fr-FR"/>
           </a:p>
@@ -4989,7 +5004,7 @@
           <a:p>
             <a:fld id="{22EBEF4F-4056-4A7E-9612-F3E8B502E28B}" type="slidenum">
               <a:rPr lang="fr-FR" smtClean="0"/>
-              <a:t>‹N°›</a:t>
+              <a:t>‹#›</a:t>
             </a:fld>
             <a:endParaRPr lang="fr-FR"/>
           </a:p>
@@ -5170,7 +5185,7 @@
           <a:p>
             <a:fld id="{0C6102B9-41E8-4E57-8EA6-AB67D80E10AB}" type="datetime1">
               <a:rPr lang="fr-FR" smtClean="0"/>
-              <a:t>10/09/2019</a:t>
+              <a:t>12/09/2019</a:t>
             </a:fld>
             <a:endParaRPr lang="fr-FR"/>
           </a:p>
@@ -5222,7 +5237,7 @@
           <a:p>
             <a:fld id="{22EBEF4F-4056-4A7E-9612-F3E8B502E28B}" type="slidenum">
               <a:rPr lang="fr-FR" smtClean="0"/>
-              <a:t>‹N°›</a:t>
+              <a:t>‹#›</a:t>
             </a:fld>
             <a:endParaRPr lang="fr-FR"/>
           </a:p>
@@ -5411,7 +5426,7 @@
           <a:p>
             <a:fld id="{4A2428F8-4951-4546-B4FA-7B0FACC74B80}" type="datetime1">
               <a:rPr lang="fr-FR" smtClean="0"/>
-              <a:t>10/09/2019</a:t>
+              <a:t>12/09/2019</a:t>
             </a:fld>
             <a:endParaRPr lang="fr-FR"/>
           </a:p>
@@ -5463,7 +5478,7 @@
           <a:p>
             <a:fld id="{22EBEF4F-4056-4A7E-9612-F3E8B502E28B}" type="slidenum">
               <a:rPr lang="fr-FR" smtClean="0"/>
-              <a:t>‹N°›</a:t>
+              <a:t>‹#›</a:t>
             </a:fld>
             <a:endParaRPr lang="fr-FR"/>
           </a:p>
@@ -5591,7 +5606,7 @@
           <a:p>
             <a:fld id="{2468CB63-00AE-4756-B792-32C885852036}" type="datetime1">
               <a:rPr lang="fr-FR" smtClean="0"/>
-              <a:t>10/09/2019</a:t>
+              <a:t>12/09/2019</a:t>
             </a:fld>
             <a:endParaRPr lang="fr-FR"/>
           </a:p>
@@ -5638,7 +5653,7 @@
           <a:p>
             <a:fld id="{22EBEF4F-4056-4A7E-9612-F3E8B502E28B}" type="slidenum">
               <a:rPr lang="fr-FR" smtClean="0"/>
-              <a:t>‹N°›</a:t>
+              <a:t>‹#›</a:t>
             </a:fld>
             <a:endParaRPr lang="fr-FR"/>
           </a:p>
@@ -5766,7 +5781,7 @@
           <a:p>
             <a:fld id="{824ACC8D-CADA-4745-885B-C009075ACE07}" type="datetime1">
               <a:rPr lang="fr-FR" smtClean="0"/>
-              <a:t>10/09/2019</a:t>
+              <a:t>12/09/2019</a:t>
             </a:fld>
             <a:endParaRPr lang="fr-FR"/>
           </a:p>
@@ -5808,7 +5823,7 @@
           <a:p>
             <a:fld id="{22EBEF4F-4056-4A7E-9612-F3E8B502E28B}" type="slidenum">
               <a:rPr lang="fr-FR" smtClean="0"/>
-              <a:t>‹N°›</a:t>
+              <a:t>‹#›</a:t>
             </a:fld>
             <a:endParaRPr lang="fr-FR"/>
           </a:p>
@@ -6055,7 +6070,7 @@
           <a:p>
             <a:fld id="{10EA4304-F7B0-45DA-9970-108CC9362744}" type="datetime1">
               <a:rPr lang="fr-FR" smtClean="0"/>
-              <a:t>10/09/2019</a:t>
+              <a:t>12/09/2019</a:t>
             </a:fld>
             <a:endParaRPr lang="fr-FR"/>
           </a:p>
@@ -6107,7 +6122,7 @@
           <a:p>
             <a:fld id="{22EBEF4F-4056-4A7E-9612-F3E8B502E28B}" type="slidenum">
               <a:rPr lang="fr-FR" smtClean="0"/>
-              <a:t>‹N°›</a:t>
+              <a:t>‹#›</a:t>
             </a:fld>
             <a:endParaRPr lang="fr-FR"/>
           </a:p>
@@ -6297,7 +6312,7 @@
           <a:p>
             <a:fld id="{5EF8BD1A-0AB3-42BB-87D7-511BD450E973}" type="datetime1">
               <a:rPr lang="fr-FR" smtClean="0"/>
-              <a:t>10/09/2019</a:t>
+              <a:t>12/09/2019</a:t>
             </a:fld>
             <a:endParaRPr lang="fr-FR"/>
           </a:p>
@@ -6339,7 +6354,7 @@
           <a:p>
             <a:fld id="{22EBEF4F-4056-4A7E-9612-F3E8B502E28B}" type="slidenum">
               <a:rPr lang="fr-FR" smtClean="0"/>
-              <a:t>‹N°›</a:t>
+              <a:t>‹#›</a:t>
             </a:fld>
             <a:endParaRPr lang="fr-FR"/>
           </a:p>
@@ -6676,7 +6691,7 @@
           <a:p>
             <a:fld id="{F0ED20F9-E137-45C5-9CDB-EB23F7F61742}" type="datetime1">
               <a:rPr lang="fr-FR" smtClean="0"/>
-              <a:t>10/09/2019</a:t>
+              <a:t>12/09/2019</a:t>
             </a:fld>
             <a:endParaRPr lang="fr-FR"/>
           </a:p>
@@ -6718,7 +6733,7 @@
           <a:p>
             <a:fld id="{22EBEF4F-4056-4A7E-9612-F3E8B502E28B}" type="slidenum">
               <a:rPr lang="fr-FR" smtClean="0"/>
-              <a:t>‹N°›</a:t>
+              <a:t>‹#›</a:t>
             </a:fld>
             <a:endParaRPr lang="fr-FR"/>
           </a:p>
@@ -6794,7 +6809,7 @@
           <a:p>
             <a:fld id="{7F549FA9-5419-4577-ACA1-5FA8B1F430E1}" type="datetime1">
               <a:rPr lang="fr-FR" smtClean="0"/>
-              <a:t>10/09/2019</a:t>
+              <a:t>12/09/2019</a:t>
             </a:fld>
             <a:endParaRPr lang="fr-FR"/>
           </a:p>
@@ -6836,7 +6851,7 @@
           <a:p>
             <a:fld id="{22EBEF4F-4056-4A7E-9612-F3E8B502E28B}" type="slidenum">
               <a:rPr lang="fr-FR" smtClean="0"/>
-              <a:t>‹N°›</a:t>
+              <a:t>‹#›</a:t>
             </a:fld>
             <a:endParaRPr lang="fr-FR"/>
           </a:p>
@@ -6889,7 +6904,7 @@
           <a:p>
             <a:fld id="{B732A3B4-D77F-4011-84A4-1CE2C85060AA}" type="datetime1">
               <a:rPr lang="fr-FR" smtClean="0"/>
-              <a:t>10/09/2019</a:t>
+              <a:t>12/09/2019</a:t>
             </a:fld>
             <a:endParaRPr lang="fr-FR"/>
           </a:p>
@@ -6931,7 +6946,7 @@
           <a:p>
             <a:fld id="{22EBEF4F-4056-4A7E-9612-F3E8B502E28B}" type="slidenum">
               <a:rPr lang="fr-FR" smtClean="0"/>
-              <a:t>‹N°›</a:t>
+              <a:t>‹#›</a:t>
             </a:fld>
             <a:endParaRPr lang="fr-FR"/>
           </a:p>
@@ -7138,7 +7153,7 @@
           <a:p>
             <a:fld id="{AFD5C01D-38A9-4545-9F6C-D14ECEB1FB25}" type="datetime1">
               <a:rPr lang="fr-FR" smtClean="0"/>
-              <a:t>10/09/2019</a:t>
+              <a:t>12/09/2019</a:t>
             </a:fld>
             <a:endParaRPr lang="fr-FR"/>
           </a:p>
@@ -7180,7 +7195,7 @@
           <a:p>
             <a:fld id="{22EBEF4F-4056-4A7E-9612-F3E8B502E28B}" type="slidenum">
               <a:rPr lang="fr-FR" smtClean="0"/>
-              <a:t>‹N°›</a:t>
+              <a:t>‹#›</a:t>
             </a:fld>
             <a:endParaRPr lang="fr-FR"/>
           </a:p>
@@ -7395,7 +7410,7 @@
           <a:p>
             <a:fld id="{AD9F5F43-A7C8-4BE7-8EDD-3B94DD5ED3AC}" type="datetime1">
               <a:rPr lang="fr-FR" smtClean="0"/>
-              <a:t>10/09/2019</a:t>
+              <a:t>12/09/2019</a:t>
             </a:fld>
             <a:endParaRPr lang="fr-FR"/>
           </a:p>
@@ -7437,7 +7452,7 @@
           <a:p>
             <a:fld id="{22EBEF4F-4056-4A7E-9612-F3E8B502E28B}" type="slidenum">
               <a:rPr lang="fr-FR" smtClean="0"/>
-              <a:t>‹N°›</a:t>
+              <a:t>‹#›</a:t>
             </a:fld>
             <a:endParaRPr lang="fr-FR"/>
           </a:p>
@@ -7652,7 +7667,7 @@
           <a:p>
             <a:fld id="{ACB6019D-FF65-4B6D-88E7-E32520CD55FC}" type="datetime1">
               <a:rPr lang="fr-FR" smtClean="0"/>
-              <a:t>10/09/2019</a:t>
+              <a:t>12/09/2019</a:t>
             </a:fld>
             <a:endParaRPr lang="fr-FR"/>
           </a:p>
@@ -7694,7 +7709,7 @@
           <a:p>
             <a:fld id="{22EBEF4F-4056-4A7E-9612-F3E8B502E28B}" type="slidenum">
               <a:rPr lang="fr-FR" smtClean="0"/>
-              <a:t>‹N°›</a:t>
+              <a:t>‹#›</a:t>
             </a:fld>
             <a:endParaRPr lang="fr-FR"/>
           </a:p>
@@ -7883,7 +7898,7 @@
           <a:p>
             <a:fld id="{F801886C-9464-46E7-BC75-B4C59B337121}" type="datetime1">
               <a:rPr lang="fr-FR" smtClean="0"/>
-              <a:t>10/09/2019</a:t>
+              <a:t>12/09/2019</a:t>
             </a:fld>
             <a:endParaRPr lang="fr-FR"/>
           </a:p>
@@ -7935,7 +7950,7 @@
           <a:p>
             <a:fld id="{22EBEF4F-4056-4A7E-9612-F3E8B502E28B}" type="slidenum">
               <a:rPr lang="fr-FR" smtClean="0"/>
-              <a:t>‹N°›</a:t>
+              <a:t>‹#›</a:t>
             </a:fld>
             <a:endParaRPr lang="fr-FR"/>
           </a:p>
@@ -8193,7 +8208,7 @@
           <a:p>
             <a:fld id="{AB2972D2-6F14-4C24-9E0C-4FF7F34B2768}" type="datetime1">
               <a:rPr lang="fr-FR" smtClean="0"/>
-              <a:t>10/09/2019</a:t>
+              <a:t>12/09/2019</a:t>
             </a:fld>
             <a:endParaRPr lang="fr-FR"/>
           </a:p>
@@ -8245,7 +8260,7 @@
           <a:p>
             <a:fld id="{22EBEF4F-4056-4A7E-9612-F3E8B502E28B}" type="slidenum">
               <a:rPr lang="fr-FR" smtClean="0"/>
-              <a:t>‹N°›</a:t>
+              <a:t>‹#›</a:t>
             </a:fld>
             <a:endParaRPr lang="fr-FR"/>
           </a:p>
@@ -8724,7 +8739,7 @@
           <a:p>
             <a:fld id="{F898AE11-0657-4D23-A8AC-E411F594EC7D}" type="datetime1">
               <a:rPr lang="fr-FR" smtClean="0"/>
-              <a:t>10/09/2019</a:t>
+              <a:t>12/09/2019</a:t>
             </a:fld>
             <a:endParaRPr lang="fr-FR"/>
           </a:p>
@@ -8776,7 +8791,7 @@
           <a:p>
             <a:fld id="{22EBEF4F-4056-4A7E-9612-F3E8B502E28B}" type="slidenum">
               <a:rPr lang="fr-FR" smtClean="0"/>
-              <a:t>‹N°›</a:t>
+              <a:t>‹#›</a:t>
             </a:fld>
             <a:endParaRPr lang="fr-FR"/>
           </a:p>
@@ -8965,7 +8980,7 @@
           <a:p>
             <a:fld id="{150DD647-851C-4A6E-99E4-412E2060441D}" type="datetime1">
               <a:rPr lang="fr-FR" smtClean="0"/>
-              <a:t>10/09/2019</a:t>
+              <a:t>12/09/2019</a:t>
             </a:fld>
             <a:endParaRPr lang="fr-FR"/>
           </a:p>
@@ -9017,7 +9032,7 @@
           <a:p>
             <a:fld id="{22EBEF4F-4056-4A7E-9612-F3E8B502E28B}" type="slidenum">
               <a:rPr lang="fr-FR" smtClean="0"/>
-              <a:t>‹N°›</a:t>
+              <a:t>‹#›</a:t>
             </a:fld>
             <a:endParaRPr lang="fr-FR"/>
           </a:p>
@@ -9512,7 +9527,7 @@
           <a:p>
             <a:fld id="{33781566-4F69-403C-9080-3BFEE2B37491}" type="datetime1">
               <a:rPr lang="fr-FR" smtClean="0"/>
-              <a:t>10/09/2019</a:t>
+              <a:t>12/09/2019</a:t>
             </a:fld>
             <a:endParaRPr lang="fr-FR"/>
           </a:p>
@@ -9554,7 +9569,7 @@
           <a:p>
             <a:fld id="{22EBEF4F-4056-4A7E-9612-F3E8B502E28B}" type="slidenum">
               <a:rPr lang="fr-FR" smtClean="0"/>
-              <a:t>‹N°›</a:t>
+              <a:t>‹#›</a:t>
             </a:fld>
             <a:endParaRPr lang="fr-FR"/>
           </a:p>
@@ -10286,7 +10301,7 @@
           <a:p>
             <a:fld id="{14D47B0C-B5AB-42EB-BB2D-F19425E95921}" type="datetime1">
               <a:rPr lang="fr-FR" smtClean="0"/>
-              <a:t>10/09/2019</a:t>
+              <a:t>12/09/2019</a:t>
             </a:fld>
             <a:endParaRPr lang="fr-FR"/>
           </a:p>
@@ -10328,7 +10343,7 @@
           <a:p>
             <a:fld id="{22EBEF4F-4056-4A7E-9612-F3E8B502E28B}" type="slidenum">
               <a:rPr lang="fr-FR" smtClean="0"/>
-              <a:t>‹N°›</a:t>
+              <a:t>‹#›</a:t>
             </a:fld>
             <a:endParaRPr lang="fr-FR"/>
           </a:p>
@@ -10461,7 +10476,7 @@
           <a:p>
             <a:fld id="{C573A1F9-098E-4818-B4BA-05597FCE7433}" type="datetime1">
               <a:rPr lang="fr-FR" smtClean="0"/>
-              <a:t>10/09/2019</a:t>
+              <a:t>12/09/2019</a:t>
             </a:fld>
             <a:endParaRPr lang="fr-FR"/>
           </a:p>
@@ -10503,7 +10518,7 @@
           <a:p>
             <a:fld id="{22EBEF4F-4056-4A7E-9612-F3E8B502E28B}" type="slidenum">
               <a:rPr lang="fr-FR" smtClean="0"/>
-              <a:t>‹N°›</a:t>
+              <a:t>‹#›</a:t>
             </a:fld>
             <a:endParaRPr lang="fr-FR"/>
           </a:p>
@@ -10684,7 +10699,7 @@
           <a:p>
             <a:fld id="{9B85617F-11C8-46B4-82FC-6C143D8E927D}" type="datetime1">
               <a:rPr lang="fr-FR" smtClean="0"/>
-              <a:t>10/09/2019</a:t>
+              <a:t>12/09/2019</a:t>
             </a:fld>
             <a:endParaRPr lang="fr-FR"/>
           </a:p>
@@ -10736,7 +10751,7 @@
           <a:p>
             <a:fld id="{22EBEF4F-4056-4A7E-9612-F3E8B502E28B}" type="slidenum">
               <a:rPr lang="fr-FR" smtClean="0"/>
-              <a:t>‹N°›</a:t>
+              <a:t>‹#›</a:t>
             </a:fld>
             <a:endParaRPr lang="fr-FR"/>
           </a:p>
@@ -10926,7 +10941,7 @@
           <a:p>
             <a:fld id="{5F7B142A-F148-4ADB-A468-FE587DAD07D9}" type="datetime1">
               <a:rPr lang="fr-FR" smtClean="0"/>
-              <a:t>10/09/2019</a:t>
+              <a:t>12/09/2019</a:t>
             </a:fld>
             <a:endParaRPr lang="fr-FR"/>
           </a:p>
@@ -10968,7 +10983,7 @@
           <a:p>
             <a:fld id="{22EBEF4F-4056-4A7E-9612-F3E8B502E28B}" type="slidenum">
               <a:rPr lang="fr-FR" smtClean="0"/>
-              <a:t>‹N°›</a:t>
+              <a:t>‹#›</a:t>
             </a:fld>
             <a:endParaRPr lang="fr-FR"/>
           </a:p>
@@ -11305,7 +11320,7 @@
           <a:p>
             <a:fld id="{DF19706F-1691-421A-B634-B96F386F7B76}" type="datetime1">
               <a:rPr lang="fr-FR" smtClean="0"/>
-              <a:t>10/09/2019</a:t>
+              <a:t>12/09/2019</a:t>
             </a:fld>
             <a:endParaRPr lang="fr-FR"/>
           </a:p>
@@ -11347,7 +11362,7 @@
           <a:p>
             <a:fld id="{22EBEF4F-4056-4A7E-9612-F3E8B502E28B}" type="slidenum">
               <a:rPr lang="fr-FR" smtClean="0"/>
-              <a:t>‹N°›</a:t>
+              <a:t>‹#›</a:t>
             </a:fld>
             <a:endParaRPr lang="fr-FR"/>
           </a:p>
@@ -11423,7 +11438,7 @@
           <a:p>
             <a:fld id="{82E02EEA-4114-443B-89FA-6E832FF354CE}" type="datetime1">
               <a:rPr lang="fr-FR" smtClean="0"/>
-              <a:t>10/09/2019</a:t>
+              <a:t>12/09/2019</a:t>
             </a:fld>
             <a:endParaRPr lang="fr-FR"/>
           </a:p>
@@ -11465,7 +11480,7 @@
           <a:p>
             <a:fld id="{22EBEF4F-4056-4A7E-9612-F3E8B502E28B}" type="slidenum">
               <a:rPr lang="fr-FR" smtClean="0"/>
-              <a:t>‹N°›</a:t>
+              <a:t>‹#›</a:t>
             </a:fld>
             <a:endParaRPr lang="fr-FR"/>
           </a:p>
@@ -11518,7 +11533,7 @@
           <a:p>
             <a:fld id="{5BF41AA7-3BDA-4782-B3C5-401728461EBA}" type="datetime1">
               <a:rPr lang="fr-FR" smtClean="0"/>
-              <a:t>10/09/2019</a:t>
+              <a:t>12/09/2019</a:t>
             </a:fld>
             <a:endParaRPr lang="fr-FR"/>
           </a:p>
@@ -11560,7 +11575,7 @@
           <a:p>
             <a:fld id="{22EBEF4F-4056-4A7E-9612-F3E8B502E28B}" type="slidenum">
               <a:rPr lang="fr-FR" smtClean="0"/>
-              <a:t>‹N°›</a:t>
+              <a:t>‹#›</a:t>
             </a:fld>
             <a:endParaRPr lang="fr-FR"/>
           </a:p>
@@ -11767,7 +11782,7 @@
           <a:p>
             <a:fld id="{790D4B45-0ED5-401D-87BF-F27E5AD4E8F6}" type="datetime1">
               <a:rPr lang="fr-FR" smtClean="0"/>
-              <a:t>10/09/2019</a:t>
+              <a:t>12/09/2019</a:t>
             </a:fld>
             <a:endParaRPr lang="fr-FR"/>
           </a:p>
@@ -11809,7 +11824,7 @@
           <a:p>
             <a:fld id="{22EBEF4F-4056-4A7E-9612-F3E8B502E28B}" type="slidenum">
               <a:rPr lang="fr-FR" smtClean="0"/>
-              <a:t>‹N°›</a:t>
+              <a:t>‹#›</a:t>
             </a:fld>
             <a:endParaRPr lang="fr-FR"/>
           </a:p>
@@ -12024,7 +12039,7 @@
           <a:p>
             <a:fld id="{C4BA227D-3211-4923-B058-2465568DA97C}" type="datetime1">
               <a:rPr lang="fr-FR" smtClean="0"/>
-              <a:t>10/09/2019</a:t>
+              <a:t>12/09/2019</a:t>
             </a:fld>
             <a:endParaRPr lang="fr-FR"/>
           </a:p>
@@ -12066,7 +12081,7 @@
           <a:p>
             <a:fld id="{22EBEF4F-4056-4A7E-9612-F3E8B502E28B}" type="slidenum">
               <a:rPr lang="fr-FR" smtClean="0"/>
-              <a:t>‹N°›</a:t>
+              <a:t>‹#›</a:t>
             </a:fld>
             <a:endParaRPr lang="fr-FR"/>
           </a:p>
@@ -12267,7 +12282,7 @@
           <a:p>
             <a:fld id="{C0D22650-866C-43F7-8C91-C810959EF2B7}" type="datetime1">
               <a:rPr lang="fr-FR" smtClean="0"/>
-              <a:t>10/09/2019</a:t>
+              <a:t>12/09/2019</a:t>
             </a:fld>
             <a:endParaRPr lang="fr-FR"/>
           </a:p>
@@ -12345,7 +12360,7 @@
           <a:p>
             <a:fld id="{22EBEF4F-4056-4A7E-9612-F3E8B502E28B}" type="slidenum">
               <a:rPr lang="fr-FR" smtClean="0"/>
-              <a:t>‹N°›</a:t>
+              <a:t>‹#›</a:t>
             </a:fld>
             <a:endParaRPr lang="fr-FR"/>
           </a:p>
@@ -12844,7 +12859,7 @@
           <a:p>
             <a:fld id="{5B5C616A-C141-4933-A34B-F1CCCBC47195}" type="datetime1">
               <a:rPr lang="fr-FR" smtClean="0"/>
-              <a:t>10/09/2019</a:t>
+              <a:t>12/09/2019</a:t>
             </a:fld>
             <a:endParaRPr lang="fr-FR"/>
           </a:p>
@@ -12922,7 +12937,7 @@
           <a:p>
             <a:fld id="{22EBEF4F-4056-4A7E-9612-F3E8B502E28B}" type="slidenum">
               <a:rPr lang="fr-FR" smtClean="0"/>
-              <a:t>‹N°›</a:t>
+              <a:t>‹#›</a:t>
             </a:fld>
             <a:endParaRPr lang="fr-FR"/>
           </a:p>
@@ -15311,7 +15326,7 @@
         </p:blipFill>
         <p:spPr bwMode="auto">
           <a:xfrm>
-            <a:off x="0" y="0"/>
+            <a:off x="0" y="-16934"/>
             <a:ext cx="4762500" cy="2181225"/>
           </a:xfrm>
           <a:prstGeom prst="rect">

</xml_diff>